<commit_message>
Basin Sun Skin Care product store data analysis
</commit_message>
<xml_diff>
--- a/basic_sun_store.pptx
+++ b/basic_sun_store.pptx
@@ -12911,7 +12911,7 @@
           <a:p>
             <a:fld id="{0989EE75-0B03-1F49-8E84-09C83D016978}" type="datetimeFigureOut">
               <a:rPr lang="en-US" smtClean="0"/>
-              <a:t>6/24/20</a:t>
+              <a:t>6/26/20</a:t>
             </a:fld>
             <a:endParaRPr lang="en-US"/>
           </a:p>
@@ -13479,7 +13479,7 @@
           <a:p>
             <a:fld id="{ABA51BA0-D5C9-5149-BA4A-6059BD8A1904}" type="datetimeFigureOut">
               <a:rPr lang="en-US" smtClean="0"/>
-              <a:t>6/24/20</a:t>
+              <a:t>6/26/20</a:t>
             </a:fld>
             <a:endParaRPr lang="en-US"/>
           </a:p>
@@ -13814,7 +13814,7 @@
           <a:p>
             <a:fld id="{ABA51BA0-D5C9-5149-BA4A-6059BD8A1904}" type="datetimeFigureOut">
               <a:rPr lang="en-US" smtClean="0"/>
-              <a:t>6/24/20</a:t>
+              <a:t>6/26/20</a:t>
             </a:fld>
             <a:endParaRPr lang="en-US"/>
           </a:p>
@@ -14117,7 +14117,7 @@
           <a:p>
             <a:fld id="{ABA51BA0-D5C9-5149-BA4A-6059BD8A1904}" type="datetimeFigureOut">
               <a:rPr lang="en-US" smtClean="0"/>
-              <a:t>6/24/20</a:t>
+              <a:t>6/26/20</a:t>
             </a:fld>
             <a:endParaRPr lang="en-US"/>
           </a:p>
@@ -14365,7 +14365,7 @@
           <a:p>
             <a:fld id="{ABA51BA0-D5C9-5149-BA4A-6059BD8A1904}" type="datetimeFigureOut">
               <a:rPr lang="en-US" smtClean="0"/>
-              <a:t>6/24/20</a:t>
+              <a:t>6/26/20</a:t>
             </a:fld>
             <a:endParaRPr lang="en-US"/>
           </a:p>
@@ -14773,7 +14773,7 @@
           <a:p>
             <a:fld id="{ABA51BA0-D5C9-5149-BA4A-6059BD8A1904}" type="datetimeFigureOut">
               <a:rPr lang="en-US" smtClean="0"/>
-              <a:t>6/24/20</a:t>
+              <a:t>6/26/20</a:t>
             </a:fld>
             <a:endParaRPr lang="en-US"/>
           </a:p>
@@ -15088,7 +15088,7 @@
           <a:p>
             <a:fld id="{ABA51BA0-D5C9-5149-BA4A-6059BD8A1904}" type="datetimeFigureOut">
               <a:rPr lang="en-US" smtClean="0"/>
-              <a:t>6/24/20</a:t>
+              <a:t>6/26/20</a:t>
             </a:fld>
             <a:endParaRPr lang="en-US"/>
           </a:p>
@@ -15633,7 +15633,7 @@
           <a:p>
             <a:fld id="{ABA51BA0-D5C9-5149-BA4A-6059BD8A1904}" type="datetimeFigureOut">
               <a:rPr lang="en-US" smtClean="0"/>
-              <a:t>6/24/20</a:t>
+              <a:t>6/26/20</a:t>
             </a:fld>
             <a:endParaRPr lang="en-US"/>
           </a:p>
@@ -15829,7 +15829,7 @@
           <a:p>
             <a:fld id="{ABA51BA0-D5C9-5149-BA4A-6059BD8A1904}" type="datetimeFigureOut">
               <a:rPr lang="en-US" smtClean="0"/>
-              <a:t>6/24/20</a:t>
+              <a:t>6/26/20</a:t>
             </a:fld>
             <a:endParaRPr lang="en-US"/>
           </a:p>
@@ -16043,7 +16043,7 @@
           <a:p>
             <a:fld id="{ABA51BA0-D5C9-5149-BA4A-6059BD8A1904}" type="datetimeFigureOut">
               <a:rPr lang="en-US" smtClean="0"/>
-              <a:t>6/24/20</a:t>
+              <a:t>6/26/20</a:t>
             </a:fld>
             <a:endParaRPr lang="en-US"/>
           </a:p>
@@ -16413,7 +16413,7 @@
           <a:p>
             <a:fld id="{ABA51BA0-D5C9-5149-BA4A-6059BD8A1904}" type="datetimeFigureOut">
               <a:rPr lang="en-US" smtClean="0"/>
-              <a:t>6/24/20</a:t>
+              <a:t>6/26/20</a:t>
             </a:fld>
             <a:endParaRPr lang="en-US"/>
           </a:p>
@@ -16817,7 +16817,7 @@
           <a:p>
             <a:fld id="{ABA51BA0-D5C9-5149-BA4A-6059BD8A1904}" type="datetimeFigureOut">
               <a:rPr lang="en-US" smtClean="0"/>
-              <a:t>6/24/20</a:t>
+              <a:t>6/26/20</a:t>
             </a:fld>
             <a:endParaRPr lang="en-US"/>
           </a:p>
@@ -17129,7 +17129,7 @@
           <a:p>
             <a:fld id="{ABA51BA0-D5C9-5149-BA4A-6059BD8A1904}" type="datetimeFigureOut">
               <a:rPr lang="en-US" smtClean="0"/>
-              <a:t>6/24/20</a:t>
+              <a:t>6/26/20</a:t>
             </a:fld>
             <a:endParaRPr lang="en-US"/>
           </a:p>
@@ -17740,6 +17740,47 @@
               <a:t>Dittakavi</a:t>
             </a:r>
             <a:endParaRPr lang="en-US" dirty="0"/>
+          </a:p>
+        </p:txBody>
+      </p:sp>
+      <p:sp>
+        <p:nvSpPr>
+          <p:cNvPr id="5" name="TextBox 4">
+            <a:extLst>
+              <a:ext uri="{FF2B5EF4-FFF2-40B4-BE49-F238E27FC236}">
+                <a16:creationId xmlns:a16="http://schemas.microsoft.com/office/drawing/2014/main" id="{542F6BD6-8960-944A-BB0C-05271476F0F2}"/>
+              </a:ext>
+            </a:extLst>
+          </p:cNvPr>
+          <p:cNvSpPr txBox="1"/>
+          <p:nvPr/>
+        </p:nvSpPr>
+        <p:spPr>
+          <a:xfrm>
+            <a:off x="1262743" y="261257"/>
+            <a:ext cx="4246227" cy="461665"/>
+          </a:xfrm>
+          <a:prstGeom prst="rect">
+            <a:avLst/>
+          </a:prstGeom>
+          <a:noFill/>
+        </p:spPr>
+        <p:txBody>
+          <a:bodyPr wrap="none" rtlCol="0">
+            <a:spAutoFit/>
+          </a:bodyPr>
+          <a:lstStyle/>
+          <a:p>
+            <a:r>
+              <a:rPr lang="en-US" sz="1200" dirty="0"/>
+              <a:t>Data Science and Analytics Bootcamp with Stack Education</a:t>
+            </a:r>
+          </a:p>
+          <a:p>
+            <a:r>
+              <a:rPr lang="en-US" sz="1200" dirty="0"/>
+              <a:t>Framingham State University</a:t>
+            </a:r>
           </a:p>
         </p:txBody>
       </p:sp>

</xml_diff>